<commit_message>
add one curve result
</commit_message>
<xml_diff>
--- a/Openloop_Cali.pptx
+++ b/Openloop_Cali.pptx
@@ -12,6 +12,8 @@
     <p:sldId id="259" r:id="rId6"/>
     <p:sldId id="261" r:id="rId7"/>
     <p:sldId id="260" r:id="rId8"/>
+    <p:sldId id="263" r:id="rId9"/>
+    <p:sldId id="264" r:id="rId10"/>
   </p:sldIdLst>
   <p:sldSz cx="12192000" cy="6858000"/>
   <p:notesSz cx="6858000" cy="9144000"/>
@@ -265,7 +267,7 @@
           <a:p>
             <a:fld id="{E64DDFCE-F530-4609-990F-8819CCA5CEDA}" type="datetimeFigureOut">
               <a:rPr lang="zh-TW" altLang="en-US" smtClean="0"/>
-              <a:t>2025/9/30</a:t>
+              <a:t>2025/10/2</a:t>
             </a:fld>
             <a:endParaRPr lang="zh-TW" altLang="en-US"/>
           </a:p>
@@ -463,7 +465,7 @@
           <a:p>
             <a:fld id="{E64DDFCE-F530-4609-990F-8819CCA5CEDA}" type="datetimeFigureOut">
               <a:rPr lang="zh-TW" altLang="en-US" smtClean="0"/>
-              <a:t>2025/9/30</a:t>
+              <a:t>2025/10/2</a:t>
             </a:fld>
             <a:endParaRPr lang="zh-TW" altLang="en-US"/>
           </a:p>
@@ -671,7 +673,7 @@
           <a:p>
             <a:fld id="{E64DDFCE-F530-4609-990F-8819CCA5CEDA}" type="datetimeFigureOut">
               <a:rPr lang="zh-TW" altLang="en-US" smtClean="0"/>
-              <a:t>2025/9/30</a:t>
+              <a:t>2025/10/2</a:t>
             </a:fld>
             <a:endParaRPr lang="zh-TW" altLang="en-US"/>
           </a:p>
@@ -869,7 +871,7 @@
           <a:p>
             <a:fld id="{E64DDFCE-F530-4609-990F-8819CCA5CEDA}" type="datetimeFigureOut">
               <a:rPr lang="zh-TW" altLang="en-US" smtClean="0"/>
-              <a:t>2025/9/30</a:t>
+              <a:t>2025/10/2</a:t>
             </a:fld>
             <a:endParaRPr lang="zh-TW" altLang="en-US"/>
           </a:p>
@@ -1144,7 +1146,7 @@
           <a:p>
             <a:fld id="{E64DDFCE-F530-4609-990F-8819CCA5CEDA}" type="datetimeFigureOut">
               <a:rPr lang="zh-TW" altLang="en-US" smtClean="0"/>
-              <a:t>2025/9/30</a:t>
+              <a:t>2025/10/2</a:t>
             </a:fld>
             <a:endParaRPr lang="zh-TW" altLang="en-US"/>
           </a:p>
@@ -1409,7 +1411,7 @@
           <a:p>
             <a:fld id="{E64DDFCE-F530-4609-990F-8819CCA5CEDA}" type="datetimeFigureOut">
               <a:rPr lang="zh-TW" altLang="en-US" smtClean="0"/>
-              <a:t>2025/9/30</a:t>
+              <a:t>2025/10/2</a:t>
             </a:fld>
             <a:endParaRPr lang="zh-TW" altLang="en-US"/>
           </a:p>
@@ -1821,7 +1823,7 @@
           <a:p>
             <a:fld id="{E64DDFCE-F530-4609-990F-8819CCA5CEDA}" type="datetimeFigureOut">
               <a:rPr lang="zh-TW" altLang="en-US" smtClean="0"/>
-              <a:t>2025/9/30</a:t>
+              <a:t>2025/10/2</a:t>
             </a:fld>
             <a:endParaRPr lang="zh-TW" altLang="en-US"/>
           </a:p>
@@ -1962,7 +1964,7 @@
           <a:p>
             <a:fld id="{E64DDFCE-F530-4609-990F-8819CCA5CEDA}" type="datetimeFigureOut">
               <a:rPr lang="zh-TW" altLang="en-US" smtClean="0"/>
-              <a:t>2025/9/30</a:t>
+              <a:t>2025/10/2</a:t>
             </a:fld>
             <a:endParaRPr lang="zh-TW" altLang="en-US"/>
           </a:p>
@@ -2075,7 +2077,7 @@
           <a:p>
             <a:fld id="{E64DDFCE-F530-4609-990F-8819CCA5CEDA}" type="datetimeFigureOut">
               <a:rPr lang="zh-TW" altLang="en-US" smtClean="0"/>
-              <a:t>2025/9/30</a:t>
+              <a:t>2025/10/2</a:t>
             </a:fld>
             <a:endParaRPr lang="zh-TW" altLang="en-US"/>
           </a:p>
@@ -2386,7 +2388,7 @@
           <a:p>
             <a:fld id="{E64DDFCE-F530-4609-990F-8819CCA5CEDA}" type="datetimeFigureOut">
               <a:rPr lang="zh-TW" altLang="en-US" smtClean="0"/>
-              <a:t>2025/9/30</a:t>
+              <a:t>2025/10/2</a:t>
             </a:fld>
             <a:endParaRPr lang="zh-TW" altLang="en-US"/>
           </a:p>
@@ -2674,7 +2676,7 @@
           <a:p>
             <a:fld id="{E64DDFCE-F530-4609-990F-8819CCA5CEDA}" type="datetimeFigureOut">
               <a:rPr lang="zh-TW" altLang="en-US" smtClean="0"/>
-              <a:t>2025/9/30</a:t>
+              <a:t>2025/10/2</a:t>
             </a:fld>
             <a:endParaRPr lang="zh-TW" altLang="en-US"/>
           </a:p>
@@ -2915,7 +2917,7 @@
           <a:p>
             <a:fld id="{E64DDFCE-F530-4609-990F-8819CCA5CEDA}" type="datetimeFigureOut">
               <a:rPr lang="zh-TW" altLang="en-US" smtClean="0"/>
-              <a:t>2025/9/30</a:t>
+              <a:t>2025/10/2</a:t>
             </a:fld>
             <a:endParaRPr lang="zh-TW" altLang="en-US"/>
           </a:p>
@@ -4366,6 +4368,210 @@
     <p:extLst>
       <p:ext uri="{BB962C8B-B14F-4D97-AF65-F5344CB8AC3E}">
         <p14:creationId xmlns:p14="http://schemas.microsoft.com/office/powerpoint/2010/main" val="2686757437"/>
+      </p:ext>
+    </p:extLst>
+  </p:cSld>
+  <p:clrMapOvr>
+    <a:masterClrMapping/>
+  </p:clrMapOvr>
+</p:sld>
+</file>
+
+<file path=ppt/slides/slide8.xml><?xml version="1.0" encoding="utf-8"?>
+<p:sld xmlns:a="http://schemas.openxmlformats.org/drawingml/2006/main" xmlns:r="http://schemas.openxmlformats.org/officeDocument/2006/relationships" xmlns:p="http://schemas.openxmlformats.org/presentationml/2006/main">
+  <p:cSld>
+    <p:spTree>
+      <p:nvGrpSpPr>
+        <p:cNvPr id="1" name=""/>
+        <p:cNvGrpSpPr/>
+        <p:nvPr/>
+      </p:nvGrpSpPr>
+      <p:grpSpPr>
+        <a:xfrm>
+          <a:off x="0" y="0"/>
+          <a:ext cx="0" cy="0"/>
+          <a:chOff x="0" y="0"/>
+          <a:chExt cx="0" cy="0"/>
+        </a:xfrm>
+      </p:grpSpPr>
+      <p:pic>
+        <p:nvPicPr>
+          <p:cNvPr id="9" name="圖片 8" descr="一張含有 文字, 圖表, 行, 螢幕擷取畫面 的圖片&#10;&#10;AI 產生的內容可能不正確。">
+            <a:extLst>
+              <a:ext uri="{FF2B5EF4-FFF2-40B4-BE49-F238E27FC236}">
+                <a16:creationId xmlns:a16="http://schemas.microsoft.com/office/drawing/2014/main" id="{5C0E80BF-1D20-0B13-BE0D-851E78672344}"/>
+              </a:ext>
+            </a:extLst>
+          </p:cNvPr>
+          <p:cNvPicPr>
+            <a:picLocks noChangeAspect="1"/>
+          </p:cNvPicPr>
+          <p:nvPr/>
+        </p:nvPicPr>
+        <p:blipFill>
+          <a:blip r:embed="rId2">
+            <a:extLst>
+              <a:ext uri="{28A0092B-C50C-407E-A947-70E740481C1C}">
+                <a14:useLocalDpi xmlns:a14="http://schemas.microsoft.com/office/drawing/2010/main" val="0"/>
+              </a:ext>
+            </a:extLst>
+          </a:blip>
+          <a:stretch>
+            <a:fillRect/>
+          </a:stretch>
+        </p:blipFill>
+        <p:spPr>
+          <a:xfrm>
+            <a:off x="111663" y="2676862"/>
+            <a:ext cx="5984337" cy="3779118"/>
+          </a:xfrm>
+          <a:prstGeom prst="rect">
+            <a:avLst/>
+          </a:prstGeom>
+        </p:spPr>
+      </p:pic>
+      <p:pic>
+        <p:nvPicPr>
+          <p:cNvPr id="11" name="圖片 10" descr="一張含有 文字, 圖表, 行, 螢幕擷取畫面 的圖片&#10;&#10;AI 產生的內容可能不正確。">
+            <a:extLst>
+              <a:ext uri="{FF2B5EF4-FFF2-40B4-BE49-F238E27FC236}">
+                <a16:creationId xmlns:a16="http://schemas.microsoft.com/office/drawing/2014/main" id="{857EF3F0-19CF-90CC-7E2E-209834FC4077}"/>
+              </a:ext>
+            </a:extLst>
+          </p:cNvPr>
+          <p:cNvPicPr>
+            <a:picLocks noChangeAspect="1"/>
+          </p:cNvPicPr>
+          <p:nvPr/>
+        </p:nvPicPr>
+        <p:blipFill>
+          <a:blip r:embed="rId3">
+            <a:extLst>
+              <a:ext uri="{28A0092B-C50C-407E-A947-70E740481C1C}">
+                <a14:useLocalDpi xmlns:a14="http://schemas.microsoft.com/office/drawing/2010/main" val="0"/>
+              </a:ext>
+            </a:extLst>
+          </a:blip>
+          <a:stretch>
+            <a:fillRect/>
+          </a:stretch>
+        </p:blipFill>
+        <p:spPr>
+          <a:xfrm>
+            <a:off x="6096000" y="2676862"/>
+            <a:ext cx="5984337" cy="3779118"/>
+          </a:xfrm>
+          <a:prstGeom prst="rect">
+            <a:avLst/>
+          </a:prstGeom>
+        </p:spPr>
+      </p:pic>
+    </p:spTree>
+    <p:extLst>
+      <p:ext uri="{BB962C8B-B14F-4D97-AF65-F5344CB8AC3E}">
+        <p14:creationId xmlns:p14="http://schemas.microsoft.com/office/powerpoint/2010/main" val="2136732979"/>
+      </p:ext>
+    </p:extLst>
+  </p:cSld>
+  <p:clrMapOvr>
+    <a:masterClrMapping/>
+  </p:clrMapOvr>
+</p:sld>
+</file>
+
+<file path=ppt/slides/slide9.xml><?xml version="1.0" encoding="utf-8"?>
+<p:sld xmlns:a="http://schemas.openxmlformats.org/drawingml/2006/main" xmlns:r="http://schemas.openxmlformats.org/officeDocument/2006/relationships" xmlns:p="http://schemas.openxmlformats.org/presentationml/2006/main">
+  <p:cSld>
+    <p:spTree>
+      <p:nvGrpSpPr>
+        <p:cNvPr id="1" name=""/>
+        <p:cNvGrpSpPr/>
+        <p:nvPr/>
+      </p:nvGrpSpPr>
+      <p:grpSpPr>
+        <a:xfrm>
+          <a:off x="0" y="0"/>
+          <a:ext cx="0" cy="0"/>
+          <a:chOff x="0" y="0"/>
+          <a:chExt cx="0" cy="0"/>
+        </a:xfrm>
+      </p:grpSpPr>
+      <p:pic>
+        <p:nvPicPr>
+          <p:cNvPr id="5" name="圖片 4" descr="一張含有 文字, 圖表, 行, 螢幕擷取畫面 的圖片&#10;&#10;AI 產生的內容可能不正確。">
+            <a:extLst>
+              <a:ext uri="{FF2B5EF4-FFF2-40B4-BE49-F238E27FC236}">
+                <a16:creationId xmlns:a16="http://schemas.microsoft.com/office/drawing/2014/main" id="{CB4E4EB5-C0B6-5564-99FA-5E2FC90E229D}"/>
+              </a:ext>
+            </a:extLst>
+          </p:cNvPr>
+          <p:cNvPicPr>
+            <a:picLocks noChangeAspect="1"/>
+          </p:cNvPicPr>
+          <p:nvPr/>
+        </p:nvPicPr>
+        <p:blipFill>
+          <a:blip r:embed="rId2">
+            <a:extLst>
+              <a:ext uri="{28A0092B-C50C-407E-A947-70E740481C1C}">
+                <a14:useLocalDpi xmlns:a14="http://schemas.microsoft.com/office/drawing/2010/main" val="0"/>
+              </a:ext>
+            </a:extLst>
+          </a:blip>
+          <a:stretch>
+            <a:fillRect/>
+          </a:stretch>
+        </p:blipFill>
+        <p:spPr>
+          <a:xfrm>
+            <a:off x="36784" y="2658797"/>
+            <a:ext cx="6059216" cy="3826404"/>
+          </a:xfrm>
+          <a:prstGeom prst="rect">
+            <a:avLst/>
+          </a:prstGeom>
+        </p:spPr>
+      </p:pic>
+      <p:pic>
+        <p:nvPicPr>
+          <p:cNvPr id="7" name="圖片 6" descr="一張含有 文字, 圖表, 行, 螢幕擷取畫面 的圖片&#10;&#10;AI 產生的內容可能不正確。">
+            <a:extLst>
+              <a:ext uri="{FF2B5EF4-FFF2-40B4-BE49-F238E27FC236}">
+                <a16:creationId xmlns:a16="http://schemas.microsoft.com/office/drawing/2014/main" id="{33DC19FB-7869-1479-475A-71F17B4EADAC}"/>
+              </a:ext>
+            </a:extLst>
+          </p:cNvPr>
+          <p:cNvPicPr>
+            <a:picLocks noChangeAspect="1"/>
+          </p:cNvPicPr>
+          <p:nvPr/>
+        </p:nvPicPr>
+        <p:blipFill>
+          <a:blip r:embed="rId3">
+            <a:extLst>
+              <a:ext uri="{28A0092B-C50C-407E-A947-70E740481C1C}">
+                <a14:useLocalDpi xmlns:a14="http://schemas.microsoft.com/office/drawing/2010/main" val="0"/>
+              </a:ext>
+            </a:extLst>
+          </a:blip>
+          <a:stretch>
+            <a:fillRect/>
+          </a:stretch>
+        </p:blipFill>
+        <p:spPr>
+          <a:xfrm>
+            <a:off x="6096000" y="2658797"/>
+            <a:ext cx="6059216" cy="3826404"/>
+          </a:xfrm>
+          <a:prstGeom prst="rect">
+            <a:avLst/>
+          </a:prstGeom>
+        </p:spPr>
+      </p:pic>
+    </p:spTree>
+    <p:extLst>
+      <p:ext uri="{BB962C8B-B14F-4D97-AF65-F5344CB8AC3E}">
+        <p14:creationId xmlns:p14="http://schemas.microsoft.com/office/powerpoint/2010/main" val="3257696351"/>
       </p:ext>
     </p:extLst>
   </p:cSld>

</xml_diff>

<commit_message>
add mutl fitting result
</commit_message>
<xml_diff>
--- a/Openloop_Cali.pptx
+++ b/Openloop_Cali.pptx
@@ -15,6 +15,8 @@
     <p:sldId id="263" r:id="rId9"/>
     <p:sldId id="264" r:id="rId10"/>
     <p:sldId id="265" r:id="rId11"/>
+    <p:sldId id="266" r:id="rId12"/>
+    <p:sldId id="267" r:id="rId13"/>
   </p:sldIdLst>
   <p:sldSz cx="12192000" cy="6858000"/>
   <p:notesSz cx="6858000" cy="9144000"/>
@@ -268,7 +270,7 @@
           <a:p>
             <a:fld id="{E64DDFCE-F530-4609-990F-8819CCA5CEDA}" type="datetimeFigureOut">
               <a:rPr lang="zh-TW" altLang="en-US" smtClean="0"/>
-              <a:t>2025/10/2</a:t>
+              <a:t>2025/10/3</a:t>
             </a:fld>
             <a:endParaRPr lang="zh-TW" altLang="en-US"/>
           </a:p>
@@ -466,7 +468,7 @@
           <a:p>
             <a:fld id="{E64DDFCE-F530-4609-990F-8819CCA5CEDA}" type="datetimeFigureOut">
               <a:rPr lang="zh-TW" altLang="en-US" smtClean="0"/>
-              <a:t>2025/10/2</a:t>
+              <a:t>2025/10/3</a:t>
             </a:fld>
             <a:endParaRPr lang="zh-TW" altLang="en-US"/>
           </a:p>
@@ -674,7 +676,7 @@
           <a:p>
             <a:fld id="{E64DDFCE-F530-4609-990F-8819CCA5CEDA}" type="datetimeFigureOut">
               <a:rPr lang="zh-TW" altLang="en-US" smtClean="0"/>
-              <a:t>2025/10/2</a:t>
+              <a:t>2025/10/3</a:t>
             </a:fld>
             <a:endParaRPr lang="zh-TW" altLang="en-US"/>
           </a:p>
@@ -872,7 +874,7 @@
           <a:p>
             <a:fld id="{E64DDFCE-F530-4609-990F-8819CCA5CEDA}" type="datetimeFigureOut">
               <a:rPr lang="zh-TW" altLang="en-US" smtClean="0"/>
-              <a:t>2025/10/2</a:t>
+              <a:t>2025/10/3</a:t>
             </a:fld>
             <a:endParaRPr lang="zh-TW" altLang="en-US"/>
           </a:p>
@@ -1147,7 +1149,7 @@
           <a:p>
             <a:fld id="{E64DDFCE-F530-4609-990F-8819CCA5CEDA}" type="datetimeFigureOut">
               <a:rPr lang="zh-TW" altLang="en-US" smtClean="0"/>
-              <a:t>2025/10/2</a:t>
+              <a:t>2025/10/3</a:t>
             </a:fld>
             <a:endParaRPr lang="zh-TW" altLang="en-US"/>
           </a:p>
@@ -1412,7 +1414,7 @@
           <a:p>
             <a:fld id="{E64DDFCE-F530-4609-990F-8819CCA5CEDA}" type="datetimeFigureOut">
               <a:rPr lang="zh-TW" altLang="en-US" smtClean="0"/>
-              <a:t>2025/10/2</a:t>
+              <a:t>2025/10/3</a:t>
             </a:fld>
             <a:endParaRPr lang="zh-TW" altLang="en-US"/>
           </a:p>
@@ -1824,7 +1826,7 @@
           <a:p>
             <a:fld id="{E64DDFCE-F530-4609-990F-8819CCA5CEDA}" type="datetimeFigureOut">
               <a:rPr lang="zh-TW" altLang="en-US" smtClean="0"/>
-              <a:t>2025/10/2</a:t>
+              <a:t>2025/10/3</a:t>
             </a:fld>
             <a:endParaRPr lang="zh-TW" altLang="en-US"/>
           </a:p>
@@ -1965,7 +1967,7 @@
           <a:p>
             <a:fld id="{E64DDFCE-F530-4609-990F-8819CCA5CEDA}" type="datetimeFigureOut">
               <a:rPr lang="zh-TW" altLang="en-US" smtClean="0"/>
-              <a:t>2025/10/2</a:t>
+              <a:t>2025/10/3</a:t>
             </a:fld>
             <a:endParaRPr lang="zh-TW" altLang="en-US"/>
           </a:p>
@@ -2078,7 +2080,7 @@
           <a:p>
             <a:fld id="{E64DDFCE-F530-4609-990F-8819CCA5CEDA}" type="datetimeFigureOut">
               <a:rPr lang="zh-TW" altLang="en-US" smtClean="0"/>
-              <a:t>2025/10/2</a:t>
+              <a:t>2025/10/3</a:t>
             </a:fld>
             <a:endParaRPr lang="zh-TW" altLang="en-US"/>
           </a:p>
@@ -2389,7 +2391,7 @@
           <a:p>
             <a:fld id="{E64DDFCE-F530-4609-990F-8819CCA5CEDA}" type="datetimeFigureOut">
               <a:rPr lang="zh-TW" altLang="en-US" smtClean="0"/>
-              <a:t>2025/10/2</a:t>
+              <a:t>2025/10/3</a:t>
             </a:fld>
             <a:endParaRPr lang="zh-TW" altLang="en-US"/>
           </a:p>
@@ -2677,7 +2679,7 @@
           <a:p>
             <a:fld id="{E64DDFCE-F530-4609-990F-8819CCA5CEDA}" type="datetimeFigureOut">
               <a:rPr lang="zh-TW" altLang="en-US" smtClean="0"/>
-              <a:t>2025/10/2</a:t>
+              <a:t>2025/10/3</a:t>
             </a:fld>
             <a:endParaRPr lang="zh-TW" altLang="en-US"/>
           </a:p>
@@ -2918,7 +2920,7 @@
           <a:p>
             <a:fld id="{E64DDFCE-F530-4609-990F-8819CCA5CEDA}" type="datetimeFigureOut">
               <a:rPr lang="zh-TW" altLang="en-US" smtClean="0"/>
-              <a:t>2025/10/2</a:t>
+              <a:t>2025/10/3</a:t>
             </a:fld>
             <a:endParaRPr lang="zh-TW" altLang="en-US"/>
           </a:p>
@@ -3579,8 +3581,8 @@
             <a:chExt cx="7164974" cy="2638227"/>
           </a:xfrm>
         </p:grpSpPr>
-        <mc:AlternateContent xmlns:mc="http://schemas.openxmlformats.org/markup-compatibility/2006">
-          <mc:Choice xmlns:a14="http://schemas.microsoft.com/office/drawing/2010/main" Requires="a14">
+        <mc:AlternateContent xmlns:mc="http://schemas.openxmlformats.org/markup-compatibility/2006" xmlns:a14="http://schemas.microsoft.com/office/drawing/2010/main">
+          <mc:Choice Requires="a14">
             <p:sp>
               <p:nvSpPr>
                 <p:cNvPr id="6" name="文字方塊 5">
@@ -3609,6 +3611,7 @@
                 </a:bodyPr>
                 <a:lstStyle/>
                 <a:p>
+                  <a:pPr/>
                   <a14:m>
                     <m:oMathPara xmlns:m="http://schemas.openxmlformats.org/officeDocument/2006/math">
                       <m:oMathParaPr>
@@ -3862,7 +3865,7 @@
               </p:txBody>
             </p:sp>
           </mc:Choice>
-          <mc:Fallback>
+          <mc:Fallback xmlns="">
             <p:sp>
               <p:nvSpPr>
                 <p:cNvPr id="6" name="文字方塊 5">
@@ -3907,8 +3910,8 @@
             </p:sp>
           </mc:Fallback>
         </mc:AlternateContent>
-        <mc:AlternateContent xmlns:mc="http://schemas.openxmlformats.org/markup-compatibility/2006">
-          <mc:Choice xmlns:a14="http://schemas.microsoft.com/office/drawing/2010/main" Requires="a14">
+        <mc:AlternateContent xmlns:mc="http://schemas.openxmlformats.org/markup-compatibility/2006" xmlns:a14="http://schemas.microsoft.com/office/drawing/2010/main">
+          <mc:Choice Requires="a14">
             <p:sp>
               <p:nvSpPr>
                 <p:cNvPr id="7" name="文字方塊 6">
@@ -3937,6 +3940,7 @@
                 </a:bodyPr>
                 <a:lstStyle/>
                 <a:p>
+                  <a:pPr/>
                   <a14:m>
                     <m:oMathPara xmlns:m="http://schemas.openxmlformats.org/officeDocument/2006/math">
                       <m:oMathParaPr>
@@ -4508,7 +4512,7 @@
               </p:txBody>
             </p:sp>
           </mc:Choice>
-          <mc:Fallback>
+          <mc:Fallback xmlns="">
             <p:sp>
               <p:nvSpPr>
                 <p:cNvPr id="7" name="文字方塊 6">
@@ -4553,8 +4557,8 @@
             </p:sp>
           </mc:Fallback>
         </mc:AlternateContent>
-        <mc:AlternateContent xmlns:mc="http://schemas.openxmlformats.org/markup-compatibility/2006">
-          <mc:Choice xmlns:a14="http://schemas.microsoft.com/office/drawing/2010/main" Requires="a14">
+        <mc:AlternateContent xmlns:mc="http://schemas.openxmlformats.org/markup-compatibility/2006" xmlns:a14="http://schemas.microsoft.com/office/drawing/2010/main">
+          <mc:Choice Requires="a14">
             <p:sp>
               <p:nvSpPr>
                 <p:cNvPr id="8" name="文字方塊 7">
@@ -4583,6 +4587,7 @@
                 </a:bodyPr>
                 <a:lstStyle/>
                 <a:p>
+                  <a:pPr/>
                   <a14:m>
                     <m:oMathPara xmlns:m="http://schemas.openxmlformats.org/officeDocument/2006/math">
                       <m:oMathParaPr>
@@ -5148,7 +5153,7 @@
               </p:txBody>
             </p:sp>
           </mc:Choice>
-          <mc:Fallback>
+          <mc:Fallback xmlns="">
             <p:sp>
               <p:nvSpPr>
                 <p:cNvPr id="8" name="文字方塊 7">
@@ -5214,8 +5219,8 @@
             <a:chExt cx="3251531" cy="2711574"/>
           </a:xfrm>
         </p:grpSpPr>
-        <mc:AlternateContent xmlns:mc="http://schemas.openxmlformats.org/markup-compatibility/2006">
-          <mc:Choice xmlns:a14="http://schemas.microsoft.com/office/drawing/2010/main" Requires="a14">
+        <mc:AlternateContent xmlns:mc="http://schemas.openxmlformats.org/markup-compatibility/2006" xmlns:a14="http://schemas.microsoft.com/office/drawing/2010/main">
+          <mc:Choice Requires="a14">
             <p:sp>
               <p:nvSpPr>
                 <p:cNvPr id="9" name="文字方塊 8">
@@ -5244,6 +5249,7 @@
                 </a:bodyPr>
                 <a:lstStyle/>
                 <a:p>
+                  <a:pPr/>
                   <a14:m>
                     <m:oMathPara xmlns:m="http://schemas.openxmlformats.org/officeDocument/2006/math">
                       <m:oMathParaPr>
@@ -5497,7 +5503,7 @@
               </p:txBody>
             </p:sp>
           </mc:Choice>
-          <mc:Fallback>
+          <mc:Fallback xmlns="">
             <p:sp>
               <p:nvSpPr>
                 <p:cNvPr id="9" name="文字方塊 8">
@@ -5542,8 +5548,8 @@
             </p:sp>
           </mc:Fallback>
         </mc:AlternateContent>
-        <mc:AlternateContent xmlns:mc="http://schemas.openxmlformats.org/markup-compatibility/2006">
-          <mc:Choice xmlns:a14="http://schemas.microsoft.com/office/drawing/2010/main" Requires="a14">
+        <mc:AlternateContent xmlns:mc="http://schemas.openxmlformats.org/markup-compatibility/2006" xmlns:a14="http://schemas.microsoft.com/office/drawing/2010/main">
+          <mc:Choice Requires="a14">
             <p:sp>
               <p:nvSpPr>
                 <p:cNvPr id="10" name="文字方塊 9">
@@ -5572,6 +5578,7 @@
                 </a:bodyPr>
                 <a:lstStyle/>
                 <a:p>
+                  <a:pPr/>
                   <a14:m>
                     <m:oMathPara xmlns:m="http://schemas.openxmlformats.org/officeDocument/2006/math">
                       <m:oMathParaPr>
@@ -5793,7 +5800,7 @@
               </p:txBody>
             </p:sp>
           </mc:Choice>
-          <mc:Fallback>
+          <mc:Fallback xmlns="">
             <p:sp>
               <p:nvSpPr>
                 <p:cNvPr id="10" name="文字方塊 9">
@@ -5838,8 +5845,8 @@
             </p:sp>
           </mc:Fallback>
         </mc:AlternateContent>
-        <mc:AlternateContent xmlns:mc="http://schemas.openxmlformats.org/markup-compatibility/2006">
-          <mc:Choice xmlns:a14="http://schemas.microsoft.com/office/drawing/2010/main" Requires="a14">
+        <mc:AlternateContent xmlns:mc="http://schemas.openxmlformats.org/markup-compatibility/2006" xmlns:a14="http://schemas.microsoft.com/office/drawing/2010/main">
+          <mc:Choice Requires="a14">
             <p:sp>
               <p:nvSpPr>
                 <p:cNvPr id="13" name="文字方塊 12">
@@ -5868,6 +5875,7 @@
                 </a:bodyPr>
                 <a:lstStyle/>
                 <a:p>
+                  <a:pPr/>
                   <a14:m>
                     <m:oMathPara xmlns:m="http://schemas.openxmlformats.org/officeDocument/2006/math">
                       <m:oMathParaPr>
@@ -6008,7 +6016,7 @@
               </p:txBody>
             </p:sp>
           </mc:Choice>
-          <mc:Fallback>
+          <mc:Fallback xmlns="">
             <p:sp>
               <p:nvSpPr>
                 <p:cNvPr id="13" name="文字方塊 12">
@@ -6053,8 +6061,8 @@
             </p:sp>
           </mc:Fallback>
         </mc:AlternateContent>
-        <mc:AlternateContent xmlns:mc="http://schemas.openxmlformats.org/markup-compatibility/2006">
-          <mc:Choice xmlns:a14="http://schemas.microsoft.com/office/drawing/2010/main" Requires="a14">
+        <mc:AlternateContent xmlns:mc="http://schemas.openxmlformats.org/markup-compatibility/2006" xmlns:a14="http://schemas.microsoft.com/office/drawing/2010/main">
+          <mc:Choice Requires="a14">
             <p:sp>
               <p:nvSpPr>
                 <p:cNvPr id="14" name="文字方塊 13">
@@ -6083,6 +6091,7 @@
                 </a:bodyPr>
                 <a:lstStyle/>
                 <a:p>
+                  <a:pPr/>
                   <a14:m>
                     <m:oMathPara xmlns:m="http://schemas.openxmlformats.org/officeDocument/2006/math">
                       <m:oMathParaPr>
@@ -6223,7 +6232,7 @@
               </p:txBody>
             </p:sp>
           </mc:Choice>
-          <mc:Fallback>
+          <mc:Fallback xmlns="">
             <p:sp>
               <p:nvSpPr>
                 <p:cNvPr id="14" name="文字方塊 13">
@@ -6273,6 +6282,210 @@
     <p:extLst>
       <p:ext uri="{BB962C8B-B14F-4D97-AF65-F5344CB8AC3E}">
         <p14:creationId xmlns:p14="http://schemas.microsoft.com/office/powerpoint/2010/main" val="144192149"/>
+      </p:ext>
+    </p:extLst>
+  </p:cSld>
+  <p:clrMapOvr>
+    <a:masterClrMapping/>
+  </p:clrMapOvr>
+</p:sld>
+</file>
+
+<file path=ppt/slides/slide11.xml><?xml version="1.0" encoding="utf-8"?>
+<p:sld xmlns:a="http://schemas.openxmlformats.org/drawingml/2006/main" xmlns:r="http://schemas.openxmlformats.org/officeDocument/2006/relationships" xmlns:p="http://schemas.openxmlformats.org/presentationml/2006/main">
+  <p:cSld>
+    <p:spTree>
+      <p:nvGrpSpPr>
+        <p:cNvPr id="1" name=""/>
+        <p:cNvGrpSpPr/>
+        <p:nvPr/>
+      </p:nvGrpSpPr>
+      <p:grpSpPr>
+        <a:xfrm>
+          <a:off x="0" y="0"/>
+          <a:ext cx="0" cy="0"/>
+          <a:chOff x="0" y="0"/>
+          <a:chExt cx="0" cy="0"/>
+        </a:xfrm>
+      </p:grpSpPr>
+      <p:pic>
+        <p:nvPicPr>
+          <p:cNvPr id="13" name="圖片 12" descr="一張含有 文字, 螢幕擷取畫面, 圖表, 行 的圖片&#10;&#10;AI 產生的內容可能不正確。">
+            <a:extLst>
+              <a:ext uri="{FF2B5EF4-FFF2-40B4-BE49-F238E27FC236}">
+                <a16:creationId xmlns:a16="http://schemas.microsoft.com/office/drawing/2014/main" id="{7D0C073B-DD88-BE84-9F4B-9920469D8007}"/>
+              </a:ext>
+            </a:extLst>
+          </p:cNvPr>
+          <p:cNvPicPr>
+            <a:picLocks noChangeAspect="1"/>
+          </p:cNvPicPr>
+          <p:nvPr/>
+        </p:nvPicPr>
+        <p:blipFill>
+          <a:blip r:embed="rId2">
+            <a:extLst>
+              <a:ext uri="{28A0092B-C50C-407E-A947-70E740481C1C}">
+                <a14:useLocalDpi xmlns:a14="http://schemas.microsoft.com/office/drawing/2010/main" val="0"/>
+              </a:ext>
+            </a:extLst>
+          </a:blip>
+          <a:stretch>
+            <a:fillRect/>
+          </a:stretch>
+        </p:blipFill>
+        <p:spPr>
+          <a:xfrm>
+            <a:off x="6205091" y="800100"/>
+            <a:ext cx="5903218" cy="5257800"/>
+          </a:xfrm>
+          <a:prstGeom prst="rect">
+            <a:avLst/>
+          </a:prstGeom>
+        </p:spPr>
+      </p:pic>
+      <p:pic>
+        <p:nvPicPr>
+          <p:cNvPr id="15" name="圖片 14" descr="一張含有 文字, 螢幕擷取畫面, 圖表, 行 的圖片&#10;&#10;AI 產生的內容可能不正確。">
+            <a:extLst>
+              <a:ext uri="{FF2B5EF4-FFF2-40B4-BE49-F238E27FC236}">
+                <a16:creationId xmlns:a16="http://schemas.microsoft.com/office/drawing/2014/main" id="{D0AB2032-110F-187A-D97F-ADC8639C8FBB}"/>
+              </a:ext>
+            </a:extLst>
+          </p:cNvPr>
+          <p:cNvPicPr>
+            <a:picLocks noChangeAspect="1"/>
+          </p:cNvPicPr>
+          <p:nvPr/>
+        </p:nvPicPr>
+        <p:blipFill>
+          <a:blip r:embed="rId3">
+            <a:extLst>
+              <a:ext uri="{28A0092B-C50C-407E-A947-70E740481C1C}">
+                <a14:useLocalDpi xmlns:a14="http://schemas.microsoft.com/office/drawing/2010/main" val="0"/>
+              </a:ext>
+            </a:extLst>
+          </a:blip>
+          <a:stretch>
+            <a:fillRect/>
+          </a:stretch>
+        </p:blipFill>
+        <p:spPr>
+          <a:xfrm>
+            <a:off x="192782" y="800100"/>
+            <a:ext cx="5903218" cy="5257800"/>
+          </a:xfrm>
+          <a:prstGeom prst="rect">
+            <a:avLst/>
+          </a:prstGeom>
+        </p:spPr>
+      </p:pic>
+    </p:spTree>
+    <p:extLst>
+      <p:ext uri="{BB962C8B-B14F-4D97-AF65-F5344CB8AC3E}">
+        <p14:creationId xmlns:p14="http://schemas.microsoft.com/office/powerpoint/2010/main" val="2990117587"/>
+      </p:ext>
+    </p:extLst>
+  </p:cSld>
+  <p:clrMapOvr>
+    <a:masterClrMapping/>
+  </p:clrMapOvr>
+</p:sld>
+</file>
+
+<file path=ppt/slides/slide12.xml><?xml version="1.0" encoding="utf-8"?>
+<p:sld xmlns:a="http://schemas.openxmlformats.org/drawingml/2006/main" xmlns:r="http://schemas.openxmlformats.org/officeDocument/2006/relationships" xmlns:p="http://schemas.openxmlformats.org/presentationml/2006/main">
+  <p:cSld>
+    <p:spTree>
+      <p:nvGrpSpPr>
+        <p:cNvPr id="1" name=""/>
+        <p:cNvGrpSpPr/>
+        <p:nvPr/>
+      </p:nvGrpSpPr>
+      <p:grpSpPr>
+        <a:xfrm>
+          <a:off x="0" y="0"/>
+          <a:ext cx="0" cy="0"/>
+          <a:chOff x="0" y="0"/>
+          <a:chExt cx="0" cy="0"/>
+        </a:xfrm>
+      </p:grpSpPr>
+      <p:pic>
+        <p:nvPicPr>
+          <p:cNvPr id="5" name="圖片 4" descr="一張含有 文字, 螢幕擷取畫面, 圖表, 行 的圖片&#10;&#10;AI 產生的內容可能不正確。">
+            <a:extLst>
+              <a:ext uri="{FF2B5EF4-FFF2-40B4-BE49-F238E27FC236}">
+                <a16:creationId xmlns:a16="http://schemas.microsoft.com/office/drawing/2014/main" id="{2E7A5474-1EE6-854C-FEF5-0A60015924BA}"/>
+              </a:ext>
+            </a:extLst>
+          </p:cNvPr>
+          <p:cNvPicPr>
+            <a:picLocks noChangeAspect="1"/>
+          </p:cNvPicPr>
+          <p:nvPr/>
+        </p:nvPicPr>
+        <p:blipFill>
+          <a:blip r:embed="rId2">
+            <a:extLst>
+              <a:ext uri="{28A0092B-C50C-407E-A947-70E740481C1C}">
+                <a14:useLocalDpi xmlns:a14="http://schemas.microsoft.com/office/drawing/2010/main" val="0"/>
+              </a:ext>
+            </a:extLst>
+          </a:blip>
+          <a:stretch>
+            <a:fillRect/>
+          </a:stretch>
+        </p:blipFill>
+        <p:spPr>
+          <a:xfrm>
+            <a:off x="0" y="714248"/>
+            <a:ext cx="6096000" cy="5429504"/>
+          </a:xfrm>
+          <a:prstGeom prst="rect">
+            <a:avLst/>
+          </a:prstGeom>
+        </p:spPr>
+      </p:pic>
+      <p:pic>
+        <p:nvPicPr>
+          <p:cNvPr id="7" name="圖片 6" descr="一張含有 文字, 螢幕擷取畫面, 圖表, 行 的圖片&#10;&#10;AI 產生的內容可能不正確。">
+            <a:extLst>
+              <a:ext uri="{FF2B5EF4-FFF2-40B4-BE49-F238E27FC236}">
+                <a16:creationId xmlns:a16="http://schemas.microsoft.com/office/drawing/2014/main" id="{4DF2F87B-B605-34CF-9465-3BC543833D9B}"/>
+              </a:ext>
+            </a:extLst>
+          </p:cNvPr>
+          <p:cNvPicPr>
+            <a:picLocks noChangeAspect="1"/>
+          </p:cNvPicPr>
+          <p:nvPr/>
+        </p:nvPicPr>
+        <p:blipFill>
+          <a:blip r:embed="rId3">
+            <a:extLst>
+              <a:ext uri="{28A0092B-C50C-407E-A947-70E740481C1C}">
+                <a14:useLocalDpi xmlns:a14="http://schemas.microsoft.com/office/drawing/2010/main" val="0"/>
+              </a:ext>
+            </a:extLst>
+          </a:blip>
+          <a:stretch>
+            <a:fillRect/>
+          </a:stretch>
+        </p:blipFill>
+        <p:spPr>
+          <a:xfrm>
+            <a:off x="6096000" y="714248"/>
+            <a:ext cx="6096000" cy="5429504"/>
+          </a:xfrm>
+          <a:prstGeom prst="rect">
+            <a:avLst/>
+          </a:prstGeom>
+        </p:spPr>
+      </p:pic>
+    </p:spTree>
+    <p:extLst>
+      <p:ext uri="{BB962C8B-B14F-4D97-AF65-F5344CB8AC3E}">
+        <p14:creationId xmlns:p14="http://schemas.microsoft.com/office/powerpoint/2010/main" val="2088503058"/>
       </p:ext>
     </p:extLst>
   </p:cSld>

</xml_diff>